<commit_message>
add ppt files of part7
</commit_message>
<xml_diff>
--- a/PPT课件/Part6-16：DDD聚合在.NET中的实现.pptx
+++ b/PPT课件/Part6-16：DDD聚合在.NET中的实现.pptx
@@ -205,7 +205,7 @@
           <a:p>
             <a:fld id="{0A2FCA5F-0AB4-4B27-9880-843A32CD3FC4}" type="datetimeFigureOut">
               <a:rPr lang="zh-CN" altLang="en-US" smtClean="0"/>
-              <a:t>2022/1/12</a:t>
+              <a:t>2022/2/10</a:t>
             </a:fld>
             <a:endParaRPr lang="zh-CN" altLang="en-US"/>
           </a:p>
@@ -689,7 +689,7 @@
           <a:p>
             <a:fld id="{51EE646F-F65C-4115-9CFB-3F24605268F9}" type="datetimeFigureOut">
               <a:rPr lang="zh-CN" altLang="en-US" smtClean="0"/>
-              <a:t>2022/1/12</a:t>
+              <a:t>2022/2/10</a:t>
             </a:fld>
             <a:endParaRPr lang="zh-CN" altLang="en-US"/>
           </a:p>
@@ -976,7 +976,7 @@
           <a:p>
             <a:fld id="{51EE646F-F65C-4115-9CFB-3F24605268F9}" type="datetimeFigureOut">
               <a:rPr lang="zh-CN" altLang="en-US" smtClean="0"/>
-              <a:t>2022/1/12</a:t>
+              <a:t>2022/2/10</a:t>
             </a:fld>
             <a:endParaRPr lang="zh-CN" altLang="en-US"/>
           </a:p>
@@ -1168,7 +1168,7 @@
           <a:p>
             <a:fld id="{51EE646F-F65C-4115-9CFB-3F24605268F9}" type="datetimeFigureOut">
               <a:rPr lang="zh-CN" altLang="en-US" smtClean="0"/>
-              <a:t>2022/1/12</a:t>
+              <a:t>2022/2/10</a:t>
             </a:fld>
             <a:endParaRPr lang="zh-CN" altLang="en-US"/>
           </a:p>
@@ -1429,7 +1429,7 @@
           <a:p>
             <a:fld id="{51EE646F-F65C-4115-9CFB-3F24605268F9}" type="datetimeFigureOut">
               <a:rPr lang="zh-CN" altLang="en-US" smtClean="0"/>
-              <a:t>2022/1/12</a:t>
+              <a:t>2022/2/10</a:t>
             </a:fld>
             <a:endParaRPr lang="zh-CN" altLang="en-US"/>
           </a:p>
@@ -1853,7 +1853,7 @@
           <a:p>
             <a:fld id="{51EE646F-F65C-4115-9CFB-3F24605268F9}" type="datetimeFigureOut">
               <a:rPr lang="zh-CN" altLang="en-US" smtClean="0"/>
-              <a:t>2022/1/12</a:t>
+              <a:t>2022/2/10</a:t>
             </a:fld>
             <a:endParaRPr lang="zh-CN" altLang="en-US"/>
           </a:p>
@@ -2399,7 +2399,7 @@
           <a:p>
             <a:fld id="{51EE646F-F65C-4115-9CFB-3F24605268F9}" type="datetimeFigureOut">
               <a:rPr lang="zh-CN" altLang="en-US" smtClean="0"/>
-              <a:t>2022/1/12</a:t>
+              <a:t>2022/2/10</a:t>
             </a:fld>
             <a:endParaRPr lang="zh-CN" altLang="en-US"/>
           </a:p>
@@ -3239,7 +3239,7 @@
           <a:p>
             <a:fld id="{51EE646F-F65C-4115-9CFB-3F24605268F9}" type="datetimeFigureOut">
               <a:rPr lang="zh-CN" altLang="en-US" smtClean="0"/>
-              <a:t>2022/1/12</a:t>
+              <a:t>2022/2/10</a:t>
             </a:fld>
             <a:endParaRPr lang="zh-CN" altLang="en-US"/>
           </a:p>
@@ -3409,7 +3409,7 @@
           <a:p>
             <a:fld id="{51EE646F-F65C-4115-9CFB-3F24605268F9}" type="datetimeFigureOut">
               <a:rPr lang="zh-CN" altLang="en-US" smtClean="0"/>
-              <a:t>2022/1/12</a:t>
+              <a:t>2022/2/10</a:t>
             </a:fld>
             <a:endParaRPr lang="zh-CN" altLang="en-US"/>
           </a:p>
@@ -3593,7 +3593,7 @@
           <a:p>
             <a:fld id="{51EE646F-F65C-4115-9CFB-3F24605268F9}" type="datetimeFigureOut">
               <a:rPr lang="zh-CN" altLang="en-US" smtClean="0"/>
-              <a:t>2022/1/12</a:t>
+              <a:t>2022/2/10</a:t>
             </a:fld>
             <a:endParaRPr lang="zh-CN" altLang="en-US"/>
           </a:p>
@@ -3763,7 +3763,7 @@
           <a:p>
             <a:fld id="{51EE646F-F65C-4115-9CFB-3F24605268F9}" type="datetimeFigureOut">
               <a:rPr lang="zh-CN" altLang="en-US" smtClean="0"/>
-              <a:t>2022/1/12</a:t>
+              <a:t>2022/2/10</a:t>
             </a:fld>
             <a:endParaRPr lang="zh-CN" altLang="en-US"/>
           </a:p>
@@ -4011,7 +4011,7 @@
           <a:p>
             <a:fld id="{51EE646F-F65C-4115-9CFB-3F24605268F9}" type="datetimeFigureOut">
               <a:rPr lang="zh-CN" altLang="en-US" smtClean="0"/>
-              <a:t>2022/1/12</a:t>
+              <a:t>2022/2/10</a:t>
             </a:fld>
             <a:endParaRPr lang="zh-CN" altLang="en-US"/>
           </a:p>
@@ -4248,7 +4248,7 @@
           <a:p>
             <a:fld id="{51EE646F-F65C-4115-9CFB-3F24605268F9}" type="datetimeFigureOut">
               <a:rPr lang="zh-CN" altLang="en-US" smtClean="0"/>
-              <a:t>2022/1/12</a:t>
+              <a:t>2022/2/10</a:t>
             </a:fld>
             <a:endParaRPr lang="zh-CN" altLang="en-US"/>
           </a:p>
@@ -4621,7 +4621,7 @@
           <a:p>
             <a:fld id="{51EE646F-F65C-4115-9CFB-3F24605268F9}" type="datetimeFigureOut">
               <a:rPr lang="zh-CN" altLang="en-US" smtClean="0"/>
-              <a:t>2022/1/12</a:t>
+              <a:t>2022/2/10</a:t>
             </a:fld>
             <a:endParaRPr lang="zh-CN" altLang="en-US"/>
           </a:p>
@@ -4739,7 +4739,7 @@
           <a:p>
             <a:fld id="{51EE646F-F65C-4115-9CFB-3F24605268F9}" type="datetimeFigureOut">
               <a:rPr lang="zh-CN" altLang="en-US" smtClean="0"/>
-              <a:t>2022/1/12</a:t>
+              <a:t>2022/2/10</a:t>
             </a:fld>
             <a:endParaRPr lang="zh-CN" altLang="en-US"/>
           </a:p>
@@ -4834,7 +4834,7 @@
           <a:p>
             <a:fld id="{51EE646F-F65C-4115-9CFB-3F24605268F9}" type="datetimeFigureOut">
               <a:rPr lang="zh-CN" altLang="en-US" smtClean="0"/>
-              <a:t>2022/1/12</a:t>
+              <a:t>2022/2/10</a:t>
             </a:fld>
             <a:endParaRPr lang="zh-CN" altLang="en-US"/>
           </a:p>
@@ -5085,7 +5085,7 @@
           <a:p>
             <a:fld id="{51EE646F-F65C-4115-9CFB-3F24605268F9}" type="datetimeFigureOut">
               <a:rPr lang="zh-CN" altLang="en-US" smtClean="0"/>
-              <a:t>2022/1/12</a:t>
+              <a:t>2022/2/10</a:t>
             </a:fld>
             <a:endParaRPr lang="zh-CN" altLang="en-US"/>
           </a:p>
@@ -5372,7 +5372,7 @@
           <a:p>
             <a:fld id="{51EE646F-F65C-4115-9CFB-3F24605268F9}" type="datetimeFigureOut">
               <a:rPr lang="zh-CN" altLang="en-US" smtClean="0"/>
-              <a:t>2022/1/12</a:t>
+              <a:t>2022/2/10</a:t>
             </a:fld>
             <a:endParaRPr lang="zh-CN" altLang="en-US"/>
           </a:p>
@@ -5585,7 +5585,7 @@
           <a:p>
             <a:fld id="{51EE646F-F65C-4115-9CFB-3F24605268F9}" type="datetimeFigureOut">
               <a:rPr lang="zh-CN" altLang="en-US" smtClean="0"/>
-              <a:t>2022/1/12</a:t>
+              <a:t>2022/2/10</a:t>
             </a:fld>
             <a:endParaRPr lang="zh-CN" altLang="en-US"/>
           </a:p>
@@ -6522,6 +6522,28 @@
             <a:r>
               <a:rPr lang="zh-CN" altLang="en-US" sz="3900" dirty="0"/>
               <a:t>类型的属性。对非聚合根实体、值对象的操作都通过根实体进行。</a:t>
+            </a:r>
+            <a:endParaRPr lang="en-US" altLang="zh-CN" sz="3900" dirty="0"/>
+          </a:p>
+          <a:p>
+            <a:pPr marL="0" indent="0">
+              <a:buNone/>
+            </a:pPr>
+            <a:r>
+              <a:rPr lang="zh-CN" altLang="en-US" sz="3900"/>
+              <a:t>跨聚合只能</a:t>
+            </a:r>
+            <a:r>
+              <a:rPr lang="zh-CN" altLang="en-US" sz="3900" dirty="0"/>
+              <a:t>引用根实体的</a:t>
+            </a:r>
+            <a:r>
+              <a:rPr lang="en-US" altLang="zh-CN" sz="3900" dirty="0"/>
+              <a:t>Id</a:t>
+            </a:r>
+            <a:r>
+              <a:rPr lang="zh-CN" altLang="en-US" sz="3900" dirty="0"/>
+              <a:t>，而不是根实体对象。</a:t>
             </a:r>
           </a:p>
         </p:txBody>

</xml_diff>